<commit_message>
R2 addition (Trust variance)
</commit_message>
<xml_diff>
--- a/Exploratory_Path/pathmodels.pptx
+++ b/Exploratory_Path/pathmodels.pptx
@@ -7,6 +7,8 @@
   <p:sldIdLst>
     <p:sldId id="256" r:id="rId2"/>
     <p:sldId id="257" r:id="rId3"/>
+    <p:sldId id="258" r:id="rId4"/>
+    <p:sldId id="259" r:id="rId5"/>
   </p:sldIdLst>
   <p:sldSz cx="12192000" cy="6858000"/>
   <p:notesSz cx="6858000" cy="9144000"/>
@@ -105,6 +107,11 @@
       </a:defRPr>
     </a:lvl9pPr>
   </p:defaultTextStyle>
+  <p:extLst>
+    <p:ext uri="{EFAFB233-063F-42B5-8137-9DF3F51BA10A}">
+      <p15:sldGuideLst xmlns:p15="http://schemas.microsoft.com/office/powerpoint/2012/main"/>
+    </p:ext>
+  </p:extLst>
 </p:presentation>
 </file>
 
@@ -255,7 +262,7 @@
           <a:p>
             <a:fld id="{9FA1C235-D5CF-F048-BFDC-6920C0F73D9B}" type="datetimeFigureOut">
               <a:rPr lang="en-US" smtClean="0"/>
-              <a:t>9/21/22</a:t>
+              <a:t>9/22/22</a:t>
             </a:fld>
             <a:endParaRPr lang="en-US"/>
           </a:p>
@@ -453,7 +460,7 @@
           <a:p>
             <a:fld id="{9FA1C235-D5CF-F048-BFDC-6920C0F73D9B}" type="datetimeFigureOut">
               <a:rPr lang="en-US" smtClean="0"/>
-              <a:t>9/21/22</a:t>
+              <a:t>9/22/22</a:t>
             </a:fld>
             <a:endParaRPr lang="en-US"/>
           </a:p>
@@ -661,7 +668,7 @@
           <a:p>
             <a:fld id="{9FA1C235-D5CF-F048-BFDC-6920C0F73D9B}" type="datetimeFigureOut">
               <a:rPr lang="en-US" smtClean="0"/>
-              <a:t>9/21/22</a:t>
+              <a:t>9/22/22</a:t>
             </a:fld>
             <a:endParaRPr lang="en-US"/>
           </a:p>
@@ -859,7 +866,7 @@
           <a:p>
             <a:fld id="{9FA1C235-D5CF-F048-BFDC-6920C0F73D9B}" type="datetimeFigureOut">
               <a:rPr lang="en-US" smtClean="0"/>
-              <a:t>9/21/22</a:t>
+              <a:t>9/22/22</a:t>
             </a:fld>
             <a:endParaRPr lang="en-US"/>
           </a:p>
@@ -1134,7 +1141,7 @@
           <a:p>
             <a:fld id="{9FA1C235-D5CF-F048-BFDC-6920C0F73D9B}" type="datetimeFigureOut">
               <a:rPr lang="en-US" smtClean="0"/>
-              <a:t>9/21/22</a:t>
+              <a:t>9/22/22</a:t>
             </a:fld>
             <a:endParaRPr lang="en-US"/>
           </a:p>
@@ -1399,7 +1406,7 @@
           <a:p>
             <a:fld id="{9FA1C235-D5CF-F048-BFDC-6920C0F73D9B}" type="datetimeFigureOut">
               <a:rPr lang="en-US" smtClean="0"/>
-              <a:t>9/21/22</a:t>
+              <a:t>9/22/22</a:t>
             </a:fld>
             <a:endParaRPr lang="en-US"/>
           </a:p>
@@ -1811,7 +1818,7 @@
           <a:p>
             <a:fld id="{9FA1C235-D5CF-F048-BFDC-6920C0F73D9B}" type="datetimeFigureOut">
               <a:rPr lang="en-US" smtClean="0"/>
-              <a:t>9/21/22</a:t>
+              <a:t>9/22/22</a:t>
             </a:fld>
             <a:endParaRPr lang="en-US"/>
           </a:p>
@@ -1952,7 +1959,7 @@
           <a:p>
             <a:fld id="{9FA1C235-D5CF-F048-BFDC-6920C0F73D9B}" type="datetimeFigureOut">
               <a:rPr lang="en-US" smtClean="0"/>
-              <a:t>9/21/22</a:t>
+              <a:t>9/22/22</a:t>
             </a:fld>
             <a:endParaRPr lang="en-US"/>
           </a:p>
@@ -2065,7 +2072,7 @@
           <a:p>
             <a:fld id="{9FA1C235-D5CF-F048-BFDC-6920C0F73D9B}" type="datetimeFigureOut">
               <a:rPr lang="en-US" smtClean="0"/>
-              <a:t>9/21/22</a:t>
+              <a:t>9/22/22</a:t>
             </a:fld>
             <a:endParaRPr lang="en-US"/>
           </a:p>
@@ -2376,7 +2383,7 @@
           <a:p>
             <a:fld id="{9FA1C235-D5CF-F048-BFDC-6920C0F73D9B}" type="datetimeFigureOut">
               <a:rPr lang="en-US" smtClean="0"/>
-              <a:t>9/21/22</a:t>
+              <a:t>9/22/22</a:t>
             </a:fld>
             <a:endParaRPr lang="en-US"/>
           </a:p>
@@ -2664,7 +2671,7 @@
           <a:p>
             <a:fld id="{9FA1C235-D5CF-F048-BFDC-6920C0F73D9B}" type="datetimeFigureOut">
               <a:rPr lang="en-US" smtClean="0"/>
-              <a:t>9/21/22</a:t>
+              <a:t>9/22/22</a:t>
             </a:fld>
             <a:endParaRPr lang="en-US"/>
           </a:p>
@@ -2905,7 +2912,7 @@
           <a:p>
             <a:fld id="{9FA1C235-D5CF-F048-BFDC-6920C0F73D9B}" type="datetimeFigureOut">
               <a:rPr lang="en-US" smtClean="0"/>
-              <a:t>9/21/22</a:t>
+              <a:t>9/22/22</a:t>
             </a:fld>
             <a:endParaRPr lang="en-US"/>
           </a:p>
@@ -5126,6 +5133,1116 @@
     <p:extLst>
       <p:ext uri="{BB962C8B-B14F-4D97-AF65-F5344CB8AC3E}">
         <p14:creationId xmlns:p14="http://schemas.microsoft.com/office/powerpoint/2010/main" val="3588344280"/>
+      </p:ext>
+    </p:extLst>
+  </p:cSld>
+  <p:clrMapOvr>
+    <a:masterClrMapping/>
+  </p:clrMapOvr>
+</p:sld>
+</file>
+
+<file path=ppt/slides/slide3.xml><?xml version="1.0" encoding="utf-8"?>
+<p:sld xmlns:a="http://schemas.openxmlformats.org/drawingml/2006/main" xmlns:r="http://schemas.openxmlformats.org/officeDocument/2006/relationships" xmlns:p="http://schemas.openxmlformats.org/presentationml/2006/main">
+  <p:cSld>
+    <p:spTree>
+      <p:nvGrpSpPr>
+        <p:cNvPr id="1" name=""/>
+        <p:cNvGrpSpPr/>
+        <p:nvPr/>
+      </p:nvGrpSpPr>
+      <p:grpSpPr>
+        <a:xfrm>
+          <a:off x="0" y="0"/>
+          <a:ext cx="0" cy="0"/>
+          <a:chOff x="0" y="0"/>
+          <a:chExt cx="0" cy="0"/>
+        </a:xfrm>
+      </p:grpSpPr>
+      <p:sp>
+        <p:nvSpPr>
+          <p:cNvPr id="4" name="Rectangle 3">
+            <a:extLst>
+              <a:ext uri="{FF2B5EF4-FFF2-40B4-BE49-F238E27FC236}">
+                <a16:creationId xmlns:a16="http://schemas.microsoft.com/office/drawing/2014/main" id="{115619AF-80BD-1D0F-2A35-697F246B9FC5}"/>
+              </a:ext>
+            </a:extLst>
+          </p:cNvPr>
+          <p:cNvSpPr/>
+          <p:nvPr/>
+        </p:nvSpPr>
+        <p:spPr>
+          <a:xfrm>
+            <a:off x="0" y="4343400"/>
+            <a:ext cx="2286000" cy="914400"/>
+          </a:xfrm>
+          <a:prstGeom prst="rect">
+            <a:avLst/>
+          </a:prstGeom>
+          <a:noFill/>
+          <a:ln w="63500">
+            <a:solidFill>
+              <a:schemeClr val="tx1"/>
+            </a:solidFill>
+          </a:ln>
+        </p:spPr>
+        <p:style>
+          <a:lnRef idx="2">
+            <a:schemeClr val="accent1">
+              <a:shade val="50000"/>
+            </a:schemeClr>
+          </a:lnRef>
+          <a:fillRef idx="1">
+            <a:schemeClr val="accent1"/>
+          </a:fillRef>
+          <a:effectRef idx="0">
+            <a:schemeClr val="accent1"/>
+          </a:effectRef>
+          <a:fontRef idx="minor">
+            <a:schemeClr val="lt1"/>
+          </a:fontRef>
+        </p:style>
+        <p:txBody>
+          <a:bodyPr rtlCol="0" anchor="ctr"/>
+          <a:lstStyle/>
+          <a:p>
+            <a:pPr algn="ctr"/>
+            <a:r>
+              <a:rPr lang="en-US" sz="2000" b="1" dirty="0">
+                <a:solidFill>
+                  <a:schemeClr val="tx1"/>
+                </a:solidFill>
+              </a:rPr>
+              <a:t>Conspiratorial Thinking</a:t>
+            </a:r>
+          </a:p>
+        </p:txBody>
+      </p:sp>
+      <p:sp>
+        <p:nvSpPr>
+          <p:cNvPr id="6" name="Rectangle 5">
+            <a:extLst>
+              <a:ext uri="{FF2B5EF4-FFF2-40B4-BE49-F238E27FC236}">
+                <a16:creationId xmlns:a16="http://schemas.microsoft.com/office/drawing/2014/main" id="{398F80E5-2F42-F57B-00F0-194928E85B11}"/>
+              </a:ext>
+            </a:extLst>
+          </p:cNvPr>
+          <p:cNvSpPr/>
+          <p:nvPr/>
+        </p:nvSpPr>
+        <p:spPr>
+          <a:xfrm>
+            <a:off x="4953000" y="1143000"/>
+            <a:ext cx="2286000" cy="914400"/>
+          </a:xfrm>
+          <a:prstGeom prst="rect">
+            <a:avLst/>
+          </a:prstGeom>
+          <a:noFill/>
+          <a:ln w="63500">
+            <a:solidFill>
+              <a:schemeClr val="tx1"/>
+            </a:solidFill>
+          </a:ln>
+        </p:spPr>
+        <p:style>
+          <a:lnRef idx="2">
+            <a:schemeClr val="accent1">
+              <a:shade val="50000"/>
+            </a:schemeClr>
+          </a:lnRef>
+          <a:fillRef idx="1">
+            <a:schemeClr val="accent1"/>
+          </a:fillRef>
+          <a:effectRef idx="0">
+            <a:schemeClr val="accent1"/>
+          </a:effectRef>
+          <a:fontRef idx="minor">
+            <a:schemeClr val="lt1"/>
+          </a:fontRef>
+        </p:style>
+        <p:txBody>
+          <a:bodyPr rtlCol="0" anchor="ctr"/>
+          <a:lstStyle/>
+          <a:p>
+            <a:pPr algn="ctr"/>
+            <a:r>
+              <a:rPr lang="en-US" sz="2000" b="1" dirty="0">
+                <a:solidFill>
+                  <a:schemeClr val="tx1"/>
+                </a:solidFill>
+              </a:rPr>
+              <a:t>Trust in government</a:t>
+            </a:r>
+          </a:p>
+        </p:txBody>
+      </p:sp>
+      <p:sp>
+        <p:nvSpPr>
+          <p:cNvPr id="8" name="Rectangle 7">
+            <a:extLst>
+              <a:ext uri="{FF2B5EF4-FFF2-40B4-BE49-F238E27FC236}">
+                <a16:creationId xmlns:a16="http://schemas.microsoft.com/office/drawing/2014/main" id="{F7445F83-EFD7-C199-4894-CEE959A35978}"/>
+              </a:ext>
+            </a:extLst>
+          </p:cNvPr>
+          <p:cNvSpPr/>
+          <p:nvPr/>
+        </p:nvSpPr>
+        <p:spPr>
+          <a:xfrm>
+            <a:off x="9906000" y="4343400"/>
+            <a:ext cx="2286000" cy="914400"/>
+          </a:xfrm>
+          <a:prstGeom prst="rect">
+            <a:avLst/>
+          </a:prstGeom>
+          <a:noFill/>
+          <a:ln w="63500">
+            <a:solidFill>
+              <a:schemeClr val="tx1"/>
+            </a:solidFill>
+          </a:ln>
+        </p:spPr>
+        <p:style>
+          <a:lnRef idx="2">
+            <a:schemeClr val="accent1">
+              <a:shade val="50000"/>
+            </a:schemeClr>
+          </a:lnRef>
+          <a:fillRef idx="1">
+            <a:schemeClr val="accent1"/>
+          </a:fillRef>
+          <a:effectRef idx="0">
+            <a:schemeClr val="accent1"/>
+          </a:effectRef>
+          <a:fontRef idx="minor">
+            <a:schemeClr val="lt1"/>
+          </a:fontRef>
+        </p:style>
+        <p:txBody>
+          <a:bodyPr rtlCol="0" anchor="ctr"/>
+          <a:lstStyle/>
+          <a:p>
+            <a:pPr algn="ctr"/>
+            <a:r>
+              <a:rPr lang="en-US" sz="2000" b="1" dirty="0">
+                <a:solidFill>
+                  <a:schemeClr val="tx1"/>
+                </a:solidFill>
+              </a:rPr>
+              <a:t>Vaccine attitudes</a:t>
+            </a:r>
+          </a:p>
+        </p:txBody>
+      </p:sp>
+      <p:cxnSp>
+        <p:nvCxnSpPr>
+          <p:cNvPr id="10" name="Straight Arrow Connector 9">
+            <a:extLst>
+              <a:ext uri="{FF2B5EF4-FFF2-40B4-BE49-F238E27FC236}">
+                <a16:creationId xmlns:a16="http://schemas.microsoft.com/office/drawing/2014/main" id="{434442DA-3788-CC0D-8D69-9699E2EB9DB0}"/>
+              </a:ext>
+            </a:extLst>
+          </p:cNvPr>
+          <p:cNvCxnSpPr>
+            <a:stCxn id="4" idx="3"/>
+            <a:endCxn id="6" idx="1"/>
+          </p:cNvCxnSpPr>
+          <p:nvPr/>
+        </p:nvCxnSpPr>
+        <p:spPr>
+          <a:xfrm flipV="1">
+            <a:off x="2286000" y="1600200"/>
+            <a:ext cx="2667000" cy="3200400"/>
+          </a:xfrm>
+          <a:prstGeom prst="straightConnector1">
+            <a:avLst/>
+          </a:prstGeom>
+          <a:ln w="63500">
+            <a:solidFill>
+              <a:srgbClr val="FF0000"/>
+            </a:solidFill>
+            <a:tailEnd type="triangle"/>
+          </a:ln>
+        </p:spPr>
+        <p:style>
+          <a:lnRef idx="1">
+            <a:schemeClr val="accent1"/>
+          </a:lnRef>
+          <a:fillRef idx="0">
+            <a:schemeClr val="accent1"/>
+          </a:fillRef>
+          <a:effectRef idx="0">
+            <a:schemeClr val="accent1"/>
+          </a:effectRef>
+          <a:fontRef idx="minor">
+            <a:schemeClr val="tx1"/>
+          </a:fontRef>
+        </p:style>
+      </p:cxnSp>
+      <p:cxnSp>
+        <p:nvCxnSpPr>
+          <p:cNvPr id="17" name="Straight Arrow Connector 16">
+            <a:extLst>
+              <a:ext uri="{FF2B5EF4-FFF2-40B4-BE49-F238E27FC236}">
+                <a16:creationId xmlns:a16="http://schemas.microsoft.com/office/drawing/2014/main" id="{DBD19668-04D1-5799-EC81-CF3ED3724DC6}"/>
+              </a:ext>
+            </a:extLst>
+          </p:cNvPr>
+          <p:cNvCxnSpPr>
+            <a:cxnSpLocks/>
+            <a:stCxn id="4" idx="3"/>
+            <a:endCxn id="8" idx="1"/>
+          </p:cNvCxnSpPr>
+          <p:nvPr/>
+        </p:nvCxnSpPr>
+        <p:spPr>
+          <a:xfrm>
+            <a:off x="2286000" y="4800600"/>
+            <a:ext cx="7620000" cy="0"/>
+          </a:xfrm>
+          <a:prstGeom prst="straightConnector1">
+            <a:avLst/>
+          </a:prstGeom>
+          <a:ln w="63500">
+            <a:solidFill>
+              <a:srgbClr val="FF0000"/>
+            </a:solidFill>
+            <a:tailEnd type="triangle"/>
+          </a:ln>
+        </p:spPr>
+        <p:style>
+          <a:lnRef idx="1">
+            <a:schemeClr val="accent1"/>
+          </a:lnRef>
+          <a:fillRef idx="0">
+            <a:schemeClr val="accent1"/>
+          </a:fillRef>
+          <a:effectRef idx="0">
+            <a:schemeClr val="accent1"/>
+          </a:effectRef>
+          <a:fontRef idx="minor">
+            <a:schemeClr val="tx1"/>
+          </a:fontRef>
+        </p:style>
+      </p:cxnSp>
+      <p:cxnSp>
+        <p:nvCxnSpPr>
+          <p:cNvPr id="20" name="Straight Arrow Connector 19">
+            <a:extLst>
+              <a:ext uri="{FF2B5EF4-FFF2-40B4-BE49-F238E27FC236}">
+                <a16:creationId xmlns:a16="http://schemas.microsoft.com/office/drawing/2014/main" id="{2B8924C0-D2A8-EE1F-7AA5-267846BF0EA0}"/>
+              </a:ext>
+            </a:extLst>
+          </p:cNvPr>
+          <p:cNvCxnSpPr>
+            <a:cxnSpLocks/>
+            <a:stCxn id="6" idx="3"/>
+            <a:endCxn id="8" idx="1"/>
+          </p:cNvCxnSpPr>
+          <p:nvPr/>
+        </p:nvCxnSpPr>
+        <p:spPr>
+          <a:xfrm>
+            <a:off x="7239000" y="1600200"/>
+            <a:ext cx="2667000" cy="3200400"/>
+          </a:xfrm>
+          <a:prstGeom prst="straightConnector1">
+            <a:avLst/>
+          </a:prstGeom>
+          <a:ln w="63500">
+            <a:solidFill>
+              <a:schemeClr val="tx1"/>
+            </a:solidFill>
+            <a:tailEnd type="triangle"/>
+          </a:ln>
+        </p:spPr>
+        <p:style>
+          <a:lnRef idx="1">
+            <a:schemeClr val="accent1"/>
+          </a:lnRef>
+          <a:fillRef idx="0">
+            <a:schemeClr val="accent1"/>
+          </a:fillRef>
+          <a:effectRef idx="0">
+            <a:schemeClr val="accent1"/>
+          </a:effectRef>
+          <a:fontRef idx="minor">
+            <a:schemeClr val="tx1"/>
+          </a:fontRef>
+        </p:style>
+      </p:cxnSp>
+      <p:sp>
+        <p:nvSpPr>
+          <p:cNvPr id="28" name="TextBox 27">
+            <a:extLst>
+              <a:ext uri="{FF2B5EF4-FFF2-40B4-BE49-F238E27FC236}">
+                <a16:creationId xmlns:a16="http://schemas.microsoft.com/office/drawing/2014/main" id="{0866C40F-A46C-4DCC-B1DD-CE7BAE77D1CF}"/>
+              </a:ext>
+            </a:extLst>
+          </p:cNvPr>
+          <p:cNvSpPr txBox="1"/>
+          <p:nvPr/>
+        </p:nvSpPr>
+        <p:spPr>
+          <a:xfrm>
+            <a:off x="2726307" y="2554068"/>
+            <a:ext cx="893193" cy="646331"/>
+          </a:xfrm>
+          <a:prstGeom prst="rect">
+            <a:avLst/>
+          </a:prstGeom>
+          <a:noFill/>
+        </p:spPr>
+        <p:txBody>
+          <a:bodyPr wrap="none" rtlCol="0">
+            <a:spAutoFit/>
+          </a:bodyPr>
+          <a:lstStyle/>
+          <a:p>
+            <a:pPr algn="ctr"/>
+            <a:r>
+              <a:rPr lang="en-US" b="1" dirty="0">
+                <a:solidFill>
+                  <a:srgbClr val="FF0000"/>
+                </a:solidFill>
+              </a:rPr>
+              <a:t>H2a</a:t>
+            </a:r>
+          </a:p>
+          <a:p>
+            <a:pPr algn="ctr"/>
+            <a:r>
+              <a:rPr lang="en-US" b="1" i="1" dirty="0">
+                <a:solidFill>
+                  <a:srgbClr val="FF0000"/>
+                </a:solidFill>
+              </a:rPr>
+              <a:t>a</a:t>
+            </a:r>
+            <a:r>
+              <a:rPr lang="en-US" b="1" dirty="0">
+                <a:solidFill>
+                  <a:srgbClr val="FF0000"/>
+                </a:solidFill>
+              </a:rPr>
+              <a:t> = -.27</a:t>
+            </a:r>
+          </a:p>
+        </p:txBody>
+      </p:sp>
+      <p:sp>
+        <p:nvSpPr>
+          <p:cNvPr id="30" name="TextBox 29">
+            <a:extLst>
+              <a:ext uri="{FF2B5EF4-FFF2-40B4-BE49-F238E27FC236}">
+                <a16:creationId xmlns:a16="http://schemas.microsoft.com/office/drawing/2014/main" id="{33FB5819-D483-D562-4AE2-98049342703D}"/>
+              </a:ext>
+            </a:extLst>
+          </p:cNvPr>
+          <p:cNvSpPr txBox="1"/>
+          <p:nvPr/>
+        </p:nvSpPr>
+        <p:spPr>
+          <a:xfrm>
+            <a:off x="4310447" y="4800600"/>
+            <a:ext cx="3571106" cy="1200329"/>
+          </a:xfrm>
+          <a:prstGeom prst="rect">
+            <a:avLst/>
+          </a:prstGeom>
+          <a:noFill/>
+        </p:spPr>
+        <p:txBody>
+          <a:bodyPr wrap="none" rtlCol="0">
+            <a:spAutoFit/>
+          </a:bodyPr>
+          <a:lstStyle/>
+          <a:p>
+            <a:pPr algn="ctr"/>
+            <a:r>
+              <a:rPr lang="en-US" b="1" dirty="0">
+                <a:solidFill>
+                  <a:srgbClr val="FF0000"/>
+                </a:solidFill>
+              </a:rPr>
+              <a:t>H2c</a:t>
+            </a:r>
+          </a:p>
+          <a:p>
+            <a:pPr algn="ctr"/>
+            <a:r>
+              <a:rPr lang="en-US" b="1" dirty="0">
+                <a:solidFill>
+                  <a:srgbClr val="FF0000"/>
+                </a:solidFill>
+              </a:rPr>
+              <a:t>total effect: </a:t>
+            </a:r>
+            <a:r>
+              <a:rPr lang="en-US" b="1" i="1" dirty="0">
+                <a:solidFill>
+                  <a:srgbClr val="FF0000"/>
+                </a:solidFill>
+              </a:rPr>
+              <a:t>c</a:t>
+            </a:r>
+            <a:r>
+              <a:rPr lang="en-US" b="1" dirty="0">
+                <a:solidFill>
+                  <a:srgbClr val="FF0000"/>
+                </a:solidFill>
+              </a:rPr>
+              <a:t> = -.30</a:t>
+            </a:r>
+          </a:p>
+          <a:p>
+            <a:pPr algn="ctr"/>
+            <a:r>
+              <a:rPr lang="en-US" b="1" dirty="0">
+                <a:solidFill>
+                  <a:srgbClr val="FF0000"/>
+                </a:solidFill>
+              </a:rPr>
+              <a:t>direct effect: </a:t>
+            </a:r>
+            <a:r>
+              <a:rPr lang="en-US" b="1" i="1" dirty="0">
+                <a:solidFill>
+                  <a:srgbClr val="FF0000"/>
+                </a:solidFill>
+              </a:rPr>
+              <a:t>c</a:t>
+            </a:r>
+            <a:r>
+              <a:rPr lang="en-US" b="1" dirty="0">
+                <a:solidFill>
+                  <a:srgbClr val="FF0000"/>
+                </a:solidFill>
+              </a:rPr>
+              <a:t>’ = -.25</a:t>
+            </a:r>
+          </a:p>
+          <a:p>
+            <a:pPr algn="ctr"/>
+            <a:r>
+              <a:rPr lang="en-US" b="1" dirty="0">
+                <a:solidFill>
+                  <a:srgbClr val="FF0000"/>
+                </a:solidFill>
+              </a:rPr>
+              <a:t>15.16% of the total effect mediated</a:t>
+            </a:r>
+          </a:p>
+        </p:txBody>
+      </p:sp>
+      <p:sp>
+        <p:nvSpPr>
+          <p:cNvPr id="31" name="TextBox 30">
+            <a:extLst>
+              <a:ext uri="{FF2B5EF4-FFF2-40B4-BE49-F238E27FC236}">
+                <a16:creationId xmlns:a16="http://schemas.microsoft.com/office/drawing/2014/main" id="{A6B29003-E036-CB9A-19CF-D3C892B0C6EF}"/>
+              </a:ext>
+            </a:extLst>
+          </p:cNvPr>
+          <p:cNvSpPr txBox="1"/>
+          <p:nvPr/>
+        </p:nvSpPr>
+        <p:spPr>
+          <a:xfrm>
+            <a:off x="8572500" y="2554068"/>
+            <a:ext cx="938078" cy="646331"/>
+          </a:xfrm>
+          <a:prstGeom prst="rect">
+            <a:avLst/>
+          </a:prstGeom>
+          <a:noFill/>
+        </p:spPr>
+        <p:txBody>
+          <a:bodyPr wrap="none" rtlCol="0">
+            <a:spAutoFit/>
+          </a:bodyPr>
+          <a:lstStyle/>
+          <a:p>
+            <a:pPr algn="ctr"/>
+            <a:r>
+              <a:rPr lang="en-US" b="1" dirty="0"/>
+              <a:t>H2b</a:t>
+            </a:r>
+          </a:p>
+          <a:p>
+            <a:pPr algn="ctr"/>
+            <a:r>
+              <a:rPr lang="en-US" b="1" i="1" dirty="0"/>
+              <a:t>b</a:t>
+            </a:r>
+            <a:r>
+              <a:rPr lang="en-US" b="1" dirty="0"/>
+              <a:t> = +.17</a:t>
+            </a:r>
+          </a:p>
+        </p:txBody>
+      </p:sp>
+    </p:spTree>
+    <p:extLst>
+      <p:ext uri="{BB962C8B-B14F-4D97-AF65-F5344CB8AC3E}">
+        <p14:creationId xmlns:p14="http://schemas.microsoft.com/office/powerpoint/2010/main" val="2439094173"/>
+      </p:ext>
+    </p:extLst>
+  </p:cSld>
+  <p:clrMapOvr>
+    <a:masterClrMapping/>
+  </p:clrMapOvr>
+</p:sld>
+</file>
+
+<file path=ppt/slides/slide4.xml><?xml version="1.0" encoding="utf-8"?>
+<p:sld xmlns:a="http://schemas.openxmlformats.org/drawingml/2006/main" xmlns:r="http://schemas.openxmlformats.org/officeDocument/2006/relationships" xmlns:p="http://schemas.openxmlformats.org/presentationml/2006/main">
+  <p:cSld>
+    <p:spTree>
+      <p:nvGrpSpPr>
+        <p:cNvPr id="1" name=""/>
+        <p:cNvGrpSpPr/>
+        <p:nvPr/>
+      </p:nvGrpSpPr>
+      <p:grpSpPr>
+        <a:xfrm>
+          <a:off x="0" y="0"/>
+          <a:ext cx="0" cy="0"/>
+          <a:chOff x="0" y="0"/>
+          <a:chExt cx="0" cy="0"/>
+        </a:xfrm>
+      </p:grpSpPr>
+      <p:sp>
+        <p:nvSpPr>
+          <p:cNvPr id="4" name="Rectangle 3">
+            <a:extLst>
+              <a:ext uri="{FF2B5EF4-FFF2-40B4-BE49-F238E27FC236}">
+                <a16:creationId xmlns:a16="http://schemas.microsoft.com/office/drawing/2014/main" id="{115619AF-80BD-1D0F-2A35-697F246B9FC5}"/>
+              </a:ext>
+            </a:extLst>
+          </p:cNvPr>
+          <p:cNvSpPr/>
+          <p:nvPr/>
+        </p:nvSpPr>
+        <p:spPr>
+          <a:xfrm>
+            <a:off x="0" y="4343400"/>
+            <a:ext cx="2286000" cy="914400"/>
+          </a:xfrm>
+          <a:prstGeom prst="rect">
+            <a:avLst/>
+          </a:prstGeom>
+          <a:noFill/>
+          <a:ln w="63500">
+            <a:solidFill>
+              <a:schemeClr val="tx1"/>
+            </a:solidFill>
+          </a:ln>
+        </p:spPr>
+        <p:style>
+          <a:lnRef idx="2">
+            <a:schemeClr val="accent1">
+              <a:shade val="50000"/>
+            </a:schemeClr>
+          </a:lnRef>
+          <a:fillRef idx="1">
+            <a:schemeClr val="accent1"/>
+          </a:fillRef>
+          <a:effectRef idx="0">
+            <a:schemeClr val="accent1"/>
+          </a:effectRef>
+          <a:fontRef idx="minor">
+            <a:schemeClr val="lt1"/>
+          </a:fontRef>
+        </p:style>
+        <p:txBody>
+          <a:bodyPr rtlCol="0" anchor="ctr"/>
+          <a:lstStyle/>
+          <a:p>
+            <a:pPr algn="ctr"/>
+            <a:r>
+              <a:rPr lang="en-US" sz="2000" b="1" dirty="0">
+                <a:solidFill>
+                  <a:schemeClr val="tx1"/>
+                </a:solidFill>
+              </a:rPr>
+              <a:t>Anti-expert sentiments</a:t>
+            </a:r>
+          </a:p>
+        </p:txBody>
+      </p:sp>
+      <p:sp>
+        <p:nvSpPr>
+          <p:cNvPr id="6" name="Rectangle 5">
+            <a:extLst>
+              <a:ext uri="{FF2B5EF4-FFF2-40B4-BE49-F238E27FC236}">
+                <a16:creationId xmlns:a16="http://schemas.microsoft.com/office/drawing/2014/main" id="{398F80E5-2F42-F57B-00F0-194928E85B11}"/>
+              </a:ext>
+            </a:extLst>
+          </p:cNvPr>
+          <p:cNvSpPr/>
+          <p:nvPr/>
+        </p:nvSpPr>
+        <p:spPr>
+          <a:xfrm>
+            <a:off x="4953000" y="1143000"/>
+            <a:ext cx="2286000" cy="914400"/>
+          </a:xfrm>
+          <a:prstGeom prst="rect">
+            <a:avLst/>
+          </a:prstGeom>
+          <a:noFill/>
+          <a:ln w="63500">
+            <a:solidFill>
+              <a:schemeClr val="tx1"/>
+            </a:solidFill>
+          </a:ln>
+        </p:spPr>
+        <p:style>
+          <a:lnRef idx="2">
+            <a:schemeClr val="accent1">
+              <a:shade val="50000"/>
+            </a:schemeClr>
+          </a:lnRef>
+          <a:fillRef idx="1">
+            <a:schemeClr val="accent1"/>
+          </a:fillRef>
+          <a:effectRef idx="0">
+            <a:schemeClr val="accent1"/>
+          </a:effectRef>
+          <a:fontRef idx="minor">
+            <a:schemeClr val="lt1"/>
+          </a:fontRef>
+        </p:style>
+        <p:txBody>
+          <a:bodyPr rtlCol="0" anchor="ctr"/>
+          <a:lstStyle/>
+          <a:p>
+            <a:pPr algn="ctr"/>
+            <a:r>
+              <a:rPr lang="en-US" sz="2000" b="1" dirty="0">
+                <a:solidFill>
+                  <a:schemeClr val="tx1"/>
+                </a:solidFill>
+              </a:rPr>
+              <a:t>Trust in the scientific research community</a:t>
+            </a:r>
+          </a:p>
+        </p:txBody>
+      </p:sp>
+      <p:sp>
+        <p:nvSpPr>
+          <p:cNvPr id="8" name="Rectangle 7">
+            <a:extLst>
+              <a:ext uri="{FF2B5EF4-FFF2-40B4-BE49-F238E27FC236}">
+                <a16:creationId xmlns:a16="http://schemas.microsoft.com/office/drawing/2014/main" id="{F7445F83-EFD7-C199-4894-CEE959A35978}"/>
+              </a:ext>
+            </a:extLst>
+          </p:cNvPr>
+          <p:cNvSpPr/>
+          <p:nvPr/>
+        </p:nvSpPr>
+        <p:spPr>
+          <a:xfrm>
+            <a:off x="9906000" y="4343400"/>
+            <a:ext cx="2286000" cy="914400"/>
+          </a:xfrm>
+          <a:prstGeom prst="rect">
+            <a:avLst/>
+          </a:prstGeom>
+          <a:noFill/>
+          <a:ln w="63500">
+            <a:solidFill>
+              <a:schemeClr val="tx1"/>
+            </a:solidFill>
+          </a:ln>
+        </p:spPr>
+        <p:style>
+          <a:lnRef idx="2">
+            <a:schemeClr val="accent1">
+              <a:shade val="50000"/>
+            </a:schemeClr>
+          </a:lnRef>
+          <a:fillRef idx="1">
+            <a:schemeClr val="accent1"/>
+          </a:fillRef>
+          <a:effectRef idx="0">
+            <a:schemeClr val="accent1"/>
+          </a:effectRef>
+          <a:fontRef idx="minor">
+            <a:schemeClr val="lt1"/>
+          </a:fontRef>
+        </p:style>
+        <p:txBody>
+          <a:bodyPr rtlCol="0" anchor="ctr"/>
+          <a:lstStyle/>
+          <a:p>
+            <a:pPr algn="ctr"/>
+            <a:r>
+              <a:rPr lang="en-US" sz="2000" b="1" dirty="0">
+                <a:solidFill>
+                  <a:schemeClr val="tx1"/>
+                </a:solidFill>
+              </a:rPr>
+              <a:t>Vaccine attitudes</a:t>
+            </a:r>
+          </a:p>
+        </p:txBody>
+      </p:sp>
+      <p:cxnSp>
+        <p:nvCxnSpPr>
+          <p:cNvPr id="10" name="Straight Arrow Connector 9">
+            <a:extLst>
+              <a:ext uri="{FF2B5EF4-FFF2-40B4-BE49-F238E27FC236}">
+                <a16:creationId xmlns:a16="http://schemas.microsoft.com/office/drawing/2014/main" id="{434442DA-3788-CC0D-8D69-9699E2EB9DB0}"/>
+              </a:ext>
+            </a:extLst>
+          </p:cNvPr>
+          <p:cNvCxnSpPr>
+            <a:stCxn id="4" idx="3"/>
+            <a:endCxn id="6" idx="1"/>
+          </p:cNvCxnSpPr>
+          <p:nvPr/>
+        </p:nvCxnSpPr>
+        <p:spPr>
+          <a:xfrm flipV="1">
+            <a:off x="2286000" y="1600200"/>
+            <a:ext cx="2667000" cy="3200400"/>
+          </a:xfrm>
+          <a:prstGeom prst="straightConnector1">
+            <a:avLst/>
+          </a:prstGeom>
+          <a:ln w="63500">
+            <a:solidFill>
+              <a:srgbClr val="FF0000"/>
+            </a:solidFill>
+            <a:tailEnd type="triangle"/>
+          </a:ln>
+        </p:spPr>
+        <p:style>
+          <a:lnRef idx="1">
+            <a:schemeClr val="accent1"/>
+          </a:lnRef>
+          <a:fillRef idx="0">
+            <a:schemeClr val="accent1"/>
+          </a:fillRef>
+          <a:effectRef idx="0">
+            <a:schemeClr val="accent1"/>
+          </a:effectRef>
+          <a:fontRef idx="minor">
+            <a:schemeClr val="tx1"/>
+          </a:fontRef>
+        </p:style>
+      </p:cxnSp>
+      <p:cxnSp>
+        <p:nvCxnSpPr>
+          <p:cNvPr id="17" name="Straight Arrow Connector 16">
+            <a:extLst>
+              <a:ext uri="{FF2B5EF4-FFF2-40B4-BE49-F238E27FC236}">
+                <a16:creationId xmlns:a16="http://schemas.microsoft.com/office/drawing/2014/main" id="{DBD19668-04D1-5799-EC81-CF3ED3724DC6}"/>
+              </a:ext>
+            </a:extLst>
+          </p:cNvPr>
+          <p:cNvCxnSpPr>
+            <a:cxnSpLocks/>
+            <a:stCxn id="4" idx="3"/>
+            <a:endCxn id="8" idx="1"/>
+          </p:cNvCxnSpPr>
+          <p:nvPr/>
+        </p:nvCxnSpPr>
+        <p:spPr>
+          <a:xfrm>
+            <a:off x="2286000" y="4800600"/>
+            <a:ext cx="7620000" cy="0"/>
+          </a:xfrm>
+          <a:prstGeom prst="straightConnector1">
+            <a:avLst/>
+          </a:prstGeom>
+          <a:ln w="63500">
+            <a:solidFill>
+              <a:srgbClr val="FF0000"/>
+            </a:solidFill>
+            <a:tailEnd type="triangle"/>
+          </a:ln>
+        </p:spPr>
+        <p:style>
+          <a:lnRef idx="1">
+            <a:schemeClr val="accent1"/>
+          </a:lnRef>
+          <a:fillRef idx="0">
+            <a:schemeClr val="accent1"/>
+          </a:fillRef>
+          <a:effectRef idx="0">
+            <a:schemeClr val="accent1"/>
+          </a:effectRef>
+          <a:fontRef idx="minor">
+            <a:schemeClr val="tx1"/>
+          </a:fontRef>
+        </p:style>
+      </p:cxnSp>
+      <p:cxnSp>
+        <p:nvCxnSpPr>
+          <p:cNvPr id="20" name="Straight Arrow Connector 19">
+            <a:extLst>
+              <a:ext uri="{FF2B5EF4-FFF2-40B4-BE49-F238E27FC236}">
+                <a16:creationId xmlns:a16="http://schemas.microsoft.com/office/drawing/2014/main" id="{2B8924C0-D2A8-EE1F-7AA5-267846BF0EA0}"/>
+              </a:ext>
+            </a:extLst>
+          </p:cNvPr>
+          <p:cNvCxnSpPr>
+            <a:cxnSpLocks/>
+            <a:stCxn id="6" idx="3"/>
+            <a:endCxn id="8" idx="1"/>
+          </p:cNvCxnSpPr>
+          <p:nvPr/>
+        </p:nvCxnSpPr>
+        <p:spPr>
+          <a:xfrm>
+            <a:off x="7239000" y="1600200"/>
+            <a:ext cx="2667000" cy="3200400"/>
+          </a:xfrm>
+          <a:prstGeom prst="straightConnector1">
+            <a:avLst/>
+          </a:prstGeom>
+          <a:ln w="63500">
+            <a:solidFill>
+              <a:schemeClr val="tx1"/>
+            </a:solidFill>
+            <a:tailEnd type="triangle"/>
+          </a:ln>
+        </p:spPr>
+        <p:style>
+          <a:lnRef idx="1">
+            <a:schemeClr val="accent1"/>
+          </a:lnRef>
+          <a:fillRef idx="0">
+            <a:schemeClr val="accent1"/>
+          </a:fillRef>
+          <a:effectRef idx="0">
+            <a:schemeClr val="accent1"/>
+          </a:effectRef>
+          <a:fontRef idx="minor">
+            <a:schemeClr val="tx1"/>
+          </a:fontRef>
+        </p:style>
+      </p:cxnSp>
+      <p:sp>
+        <p:nvSpPr>
+          <p:cNvPr id="2" name="TextBox 1">
+            <a:extLst>
+              <a:ext uri="{FF2B5EF4-FFF2-40B4-BE49-F238E27FC236}">
+                <a16:creationId xmlns:a16="http://schemas.microsoft.com/office/drawing/2014/main" id="{28A70ACD-7BFD-FB55-152E-653505F760EE}"/>
+              </a:ext>
+            </a:extLst>
+          </p:cNvPr>
+          <p:cNvSpPr txBox="1"/>
+          <p:nvPr/>
+        </p:nvSpPr>
+        <p:spPr>
+          <a:xfrm>
+            <a:off x="2726307" y="2554069"/>
+            <a:ext cx="893193" cy="646331"/>
+          </a:xfrm>
+          <a:prstGeom prst="rect">
+            <a:avLst/>
+          </a:prstGeom>
+          <a:noFill/>
+        </p:spPr>
+        <p:txBody>
+          <a:bodyPr wrap="none" rtlCol="0">
+            <a:spAutoFit/>
+          </a:bodyPr>
+          <a:lstStyle/>
+          <a:p>
+            <a:pPr algn="ctr"/>
+            <a:r>
+              <a:rPr lang="en-US" b="1" dirty="0">
+                <a:solidFill>
+                  <a:srgbClr val="FF0000"/>
+                </a:solidFill>
+              </a:rPr>
+              <a:t>H3a</a:t>
+            </a:r>
+          </a:p>
+          <a:p>
+            <a:pPr algn="ctr"/>
+            <a:r>
+              <a:rPr lang="en-US" b="1" i="1" dirty="0">
+                <a:solidFill>
+                  <a:srgbClr val="FF0000"/>
+                </a:solidFill>
+              </a:rPr>
+              <a:t>a</a:t>
+            </a:r>
+            <a:r>
+              <a:rPr lang="en-US" b="1" dirty="0">
+                <a:solidFill>
+                  <a:srgbClr val="FF0000"/>
+                </a:solidFill>
+              </a:rPr>
+              <a:t> = -.34</a:t>
+            </a:r>
+          </a:p>
+        </p:txBody>
+      </p:sp>
+      <p:sp>
+        <p:nvSpPr>
+          <p:cNvPr id="3" name="TextBox 2">
+            <a:extLst>
+              <a:ext uri="{FF2B5EF4-FFF2-40B4-BE49-F238E27FC236}">
+                <a16:creationId xmlns:a16="http://schemas.microsoft.com/office/drawing/2014/main" id="{40616CC1-9123-F8D1-FB48-4F56342AD5C6}"/>
+              </a:ext>
+            </a:extLst>
+          </p:cNvPr>
+          <p:cNvSpPr txBox="1"/>
+          <p:nvPr/>
+        </p:nvSpPr>
+        <p:spPr>
+          <a:xfrm>
+            <a:off x="4310447" y="4800600"/>
+            <a:ext cx="3571106" cy="1200329"/>
+          </a:xfrm>
+          <a:prstGeom prst="rect">
+            <a:avLst/>
+          </a:prstGeom>
+          <a:noFill/>
+        </p:spPr>
+        <p:txBody>
+          <a:bodyPr wrap="none" rtlCol="0">
+            <a:spAutoFit/>
+          </a:bodyPr>
+          <a:lstStyle/>
+          <a:p>
+            <a:pPr algn="ctr"/>
+            <a:r>
+              <a:rPr lang="en-US" b="1" dirty="0">
+                <a:solidFill>
+                  <a:srgbClr val="FF0000"/>
+                </a:solidFill>
+              </a:rPr>
+              <a:t>H3c</a:t>
+            </a:r>
+          </a:p>
+          <a:p>
+            <a:pPr algn="ctr"/>
+            <a:r>
+              <a:rPr lang="en-US" b="1" dirty="0">
+                <a:solidFill>
+                  <a:srgbClr val="FF0000"/>
+                </a:solidFill>
+              </a:rPr>
+              <a:t>total effect: </a:t>
+            </a:r>
+            <a:r>
+              <a:rPr lang="en-US" b="1" i="1" dirty="0">
+                <a:solidFill>
+                  <a:srgbClr val="FF0000"/>
+                </a:solidFill>
+              </a:rPr>
+              <a:t>c</a:t>
+            </a:r>
+            <a:r>
+              <a:rPr lang="en-US" b="1" dirty="0">
+                <a:solidFill>
+                  <a:srgbClr val="FF0000"/>
+                </a:solidFill>
+              </a:rPr>
+              <a:t> = -.28</a:t>
+            </a:r>
+          </a:p>
+          <a:p>
+            <a:pPr algn="ctr"/>
+            <a:r>
+              <a:rPr lang="en-US" b="1" dirty="0">
+                <a:solidFill>
+                  <a:srgbClr val="FF0000"/>
+                </a:solidFill>
+              </a:rPr>
+              <a:t>direct effect: </a:t>
+            </a:r>
+            <a:r>
+              <a:rPr lang="en-US" b="1" i="1" dirty="0">
+                <a:solidFill>
+                  <a:srgbClr val="FF0000"/>
+                </a:solidFill>
+              </a:rPr>
+              <a:t>c</a:t>
+            </a:r>
+            <a:r>
+              <a:rPr lang="en-US" b="1" dirty="0">
+                <a:solidFill>
+                  <a:srgbClr val="FF0000"/>
+                </a:solidFill>
+              </a:rPr>
+              <a:t>’ = -.16</a:t>
+            </a:r>
+          </a:p>
+          <a:p>
+            <a:pPr algn="ctr"/>
+            <a:r>
+              <a:rPr lang="en-US" b="1" dirty="0">
+                <a:solidFill>
+                  <a:srgbClr val="FF0000"/>
+                </a:solidFill>
+              </a:rPr>
+              <a:t>43.99% of the total effect mediated</a:t>
+            </a:r>
+          </a:p>
+        </p:txBody>
+      </p:sp>
+      <p:sp>
+        <p:nvSpPr>
+          <p:cNvPr id="5" name="TextBox 4">
+            <a:extLst>
+              <a:ext uri="{FF2B5EF4-FFF2-40B4-BE49-F238E27FC236}">
+                <a16:creationId xmlns:a16="http://schemas.microsoft.com/office/drawing/2014/main" id="{ACA16B4F-B587-0793-253F-595FAB9BA8D5}"/>
+              </a:ext>
+            </a:extLst>
+          </p:cNvPr>
+          <p:cNvSpPr txBox="1"/>
+          <p:nvPr/>
+        </p:nvSpPr>
+        <p:spPr>
+          <a:xfrm>
+            <a:off x="8572500" y="2554069"/>
+            <a:ext cx="938078" cy="646331"/>
+          </a:xfrm>
+          <a:prstGeom prst="rect">
+            <a:avLst/>
+          </a:prstGeom>
+          <a:noFill/>
+        </p:spPr>
+        <p:txBody>
+          <a:bodyPr wrap="none" rtlCol="0">
+            <a:spAutoFit/>
+          </a:bodyPr>
+          <a:lstStyle/>
+          <a:p>
+            <a:pPr algn="ctr"/>
+            <a:r>
+              <a:rPr lang="en-US" b="1" dirty="0"/>
+              <a:t>H3b</a:t>
+            </a:r>
+          </a:p>
+          <a:p>
+            <a:pPr algn="ctr"/>
+            <a:r>
+              <a:rPr lang="en-US" b="1" i="1" dirty="0"/>
+              <a:t>b</a:t>
+            </a:r>
+            <a:r>
+              <a:rPr lang="en-US" b="1" dirty="0"/>
+              <a:t> = +.37</a:t>
+            </a:r>
+          </a:p>
+        </p:txBody>
+      </p:sp>
+    </p:spTree>
+    <p:extLst>
+      <p:ext uri="{BB962C8B-B14F-4D97-AF65-F5344CB8AC3E}">
+        <p14:creationId xmlns:p14="http://schemas.microsoft.com/office/powerpoint/2010/main" val="1627601431"/>
       </p:ext>
     </p:extLst>
   </p:cSld>

</xml_diff>